<commit_message>
fix up ppt more
</commit_message>
<xml_diff>
--- a/Final Presentation/Final Project - Ehrgo Health.pptx
+++ b/Final Presentation/Final Project - Ehrgo Health.pptx
@@ -5,13 +5,17 @@
     <p:sldMasterId id="2147483648" r:id="rId2"/>
   </p:sldMasterIdLst>
   <p:notesMasterIdLst>
-    <p:notesMasterId r:id="rId7"/>
+    <p:notesMasterId r:id="rId11"/>
   </p:notesMasterIdLst>
   <p:sldIdLst>
     <p:sldId id="259" r:id="rId3"/>
     <p:sldId id="261" r:id="rId4"/>
-    <p:sldId id="275" r:id="rId5"/>
-    <p:sldId id="274" r:id="rId6"/>
+    <p:sldId id="279" r:id="rId5"/>
+    <p:sldId id="281" r:id="rId6"/>
+    <p:sldId id="280" r:id="rId7"/>
+    <p:sldId id="275" r:id="rId8"/>
+    <p:sldId id="276" r:id="rId9"/>
+    <p:sldId id="274" r:id="rId10"/>
   </p:sldIdLst>
   <p:sldSz cx="9144000" cy="6858000" type="screen4x3"/>
   <p:notesSz cx="6858000" cy="9144000"/>
@@ -125,11 +129,11 @@
         </p14:section>
         <p14:section name="Status Update" id="{521DEF98-8796-4632-831A-16252E9A6054}">
           <p14:sldIdLst>
+            <p14:sldId id="279"/>
+            <p14:sldId id="281"/>
+            <p14:sldId id="280"/>
             <p14:sldId id="275"/>
-          </p14:sldIdLst>
-        </p14:section>
-        <p14:section name="Next Steps and Action Items" id="{C24C98EC-938D-4034-8DB8-5E8DBF16E3CB}">
-          <p14:sldIdLst>
+            <p14:sldId id="276"/>
             <p14:sldId id="274"/>
           </p14:sldIdLst>
         </p14:section>
@@ -1000,7 +1004,7 @@
             <a:fld id="{5E0C3846-8D4C-4326-8BC7-9B455A036298}" type="slidenum">
               <a:rPr lang="en-US" smtClean="0"/>
               <a:pPr/>
-              <a:t>4</a:t>
+              <a:t>8</a:t>
             </a:fld>
             <a:endParaRPr lang="en-US"/>
           </a:p>
@@ -5534,6 +5538,398 @@
           <a:p>
             <a:r>
               <a:rPr lang="en-US" dirty="0" smtClean="0"/>
+              <a:t>Objectives</a:t>
+            </a:r>
+            <a:endParaRPr lang="en-US" dirty="0"/>
+          </a:p>
+        </p:txBody>
+      </p:sp>
+      <p:sp>
+        <p:nvSpPr>
+          <p:cNvPr id="3" name="Content Placeholder 2"/>
+          <p:cNvSpPr>
+            <a:spLocks noGrp="1"/>
+          </p:cNvSpPr>
+          <p:nvPr>
+            <p:ph idx="1"/>
+          </p:nvPr>
+        </p:nvSpPr>
+        <p:spPr/>
+        <p:txBody>
+          <a:bodyPr/>
+          <a:lstStyle/>
+          <a:p>
+            <a:r>
+              <a:rPr lang="en-US" dirty="0" smtClean="0"/>
+              <a:t>Implement a rudimentary EHR</a:t>
+            </a:r>
+          </a:p>
+          <a:p>
+            <a:r>
+              <a:rPr lang="en-US" dirty="0" smtClean="0"/>
+              <a:t>Implement a service that can analyze medical treatment plans</a:t>
+            </a:r>
+          </a:p>
+          <a:p>
+            <a:r>
+              <a:rPr lang="en-US" dirty="0" smtClean="0"/>
+              <a:t>Plug the service into the </a:t>
+            </a:r>
+            <a:r>
+              <a:rPr lang="en-US" dirty="0"/>
+              <a:t>EHR</a:t>
+            </a:r>
+            <a:endParaRPr lang="en-US" dirty="0" smtClean="0"/>
+          </a:p>
+          <a:p>
+            <a:r>
+              <a:rPr lang="en-US" dirty="0" smtClean="0"/>
+              <a:t>Provide </a:t>
+            </a:r>
+            <a:r>
+              <a:rPr lang="en-US" dirty="0" err="1" smtClean="0"/>
+              <a:t>fitbit</a:t>
+            </a:r>
+            <a:r>
+              <a:rPr lang="en-US" dirty="0" smtClean="0"/>
+              <a:t> login’s, and allow users to import </a:t>
+            </a:r>
+            <a:r>
+              <a:rPr lang="en-US" dirty="0" err="1" smtClean="0"/>
+              <a:t>fitbit</a:t>
+            </a:r>
+            <a:r>
+              <a:rPr lang="en-US" dirty="0" smtClean="0"/>
+              <a:t> data</a:t>
+            </a:r>
+          </a:p>
+          <a:p>
+            <a:r>
+              <a:rPr lang="en-US" dirty="0" smtClean="0"/>
+              <a:t>Create separate patient, and staff portals.</a:t>
+            </a:r>
+          </a:p>
+          <a:p>
+            <a:r>
+              <a:rPr lang="en-US" dirty="0" smtClean="0"/>
+              <a:t>Save user data back to a central </a:t>
+            </a:r>
+            <a:r>
+              <a:rPr lang="en-US" dirty="0" err="1" smtClean="0"/>
+              <a:t>Fhir</a:t>
+            </a:r>
+            <a:r>
+              <a:rPr lang="en-US" dirty="0" smtClean="0"/>
+              <a:t> server, no patient data stored locally.</a:t>
+            </a:r>
+            <a:endParaRPr lang="en-US" dirty="0"/>
+          </a:p>
+        </p:txBody>
+      </p:sp>
+    </p:spTree>
+    <p:extLst>
+      <p:ext uri="{BB962C8B-B14F-4D97-AF65-F5344CB8AC3E}">
+        <p14:creationId xmlns:p14="http://schemas.microsoft.com/office/powerpoint/2010/main" val="2826711006"/>
+      </p:ext>
+    </p:extLst>
+  </p:cSld>
+  <p:clrMapOvr>
+    <a:masterClrMapping/>
+  </p:clrMapOvr>
+  <p:transition spd="slow">
+    <p:fade/>
+  </p:transition>
+  <p:timing>
+    <p:tnLst>
+      <p:par>
+        <p:cTn id="1" dur="indefinite" restart="never" nodeType="tmRoot"/>
+      </p:par>
+    </p:tnLst>
+  </p:timing>
+</p:sld>
+</file>
+
+<file path=ppt/slides/slide4.xml><?xml version="1.0" encoding="utf-8"?>
+<p:sld xmlns:a="http://schemas.openxmlformats.org/drawingml/2006/main" xmlns:r="http://schemas.openxmlformats.org/officeDocument/2006/relationships" xmlns:p="http://schemas.openxmlformats.org/presentationml/2006/main">
+  <p:cSld>
+    <p:spTree>
+      <p:nvGrpSpPr>
+        <p:cNvPr id="1" name=""/>
+        <p:cNvGrpSpPr/>
+        <p:nvPr/>
+      </p:nvGrpSpPr>
+      <p:grpSpPr>
+        <a:xfrm>
+          <a:off x="0" y="0"/>
+          <a:ext cx="0" cy="0"/>
+          <a:chOff x="0" y="0"/>
+          <a:chExt cx="0" cy="0"/>
+        </a:xfrm>
+      </p:grpSpPr>
+      <p:sp>
+        <p:nvSpPr>
+          <p:cNvPr id="2" name="Title 1"/>
+          <p:cNvSpPr>
+            <a:spLocks noGrp="1"/>
+          </p:cNvSpPr>
+          <p:nvPr>
+            <p:ph type="title"/>
+          </p:nvPr>
+        </p:nvSpPr>
+        <p:spPr/>
+        <p:txBody>
+          <a:bodyPr/>
+          <a:lstStyle/>
+          <a:p>
+            <a:r>
+              <a:rPr lang="en-US" dirty="0" smtClean="0"/>
+              <a:t>Project Successes	</a:t>
+            </a:r>
+            <a:endParaRPr lang="en-US" dirty="0"/>
+          </a:p>
+        </p:txBody>
+      </p:sp>
+      <p:sp>
+        <p:nvSpPr>
+          <p:cNvPr id="3" name="Content Placeholder 2"/>
+          <p:cNvSpPr>
+            <a:spLocks noGrp="1"/>
+          </p:cNvSpPr>
+          <p:nvPr>
+            <p:ph idx="1"/>
+          </p:nvPr>
+        </p:nvSpPr>
+        <p:spPr/>
+        <p:txBody>
+          <a:bodyPr/>
+          <a:lstStyle/>
+          <a:p>
+            <a:r>
+              <a:rPr lang="en-US" dirty="0" smtClean="0"/>
+              <a:t>Flawless Fitbit Integration</a:t>
+            </a:r>
+          </a:p>
+          <a:p>
+            <a:r>
+              <a:rPr lang="en-US" dirty="0" smtClean="0"/>
+              <a:t>Heavy use of backend </a:t>
+            </a:r>
+            <a:r>
+              <a:rPr lang="en-US" dirty="0" err="1" smtClean="0"/>
+              <a:t>fhir</a:t>
+            </a:r>
+            <a:r>
+              <a:rPr lang="en-US" dirty="0" smtClean="0"/>
+              <a:t> servers</a:t>
+            </a:r>
+          </a:p>
+          <a:p>
+            <a:pPr lvl="1"/>
+            <a:r>
+              <a:rPr lang="en-US" dirty="0" smtClean="0"/>
+              <a:t>Decoupled from one particular server, multiple </a:t>
+            </a:r>
+            <a:r>
+              <a:rPr lang="en-US" dirty="0" err="1" smtClean="0"/>
+              <a:t>fhir</a:t>
+            </a:r>
+            <a:r>
+              <a:rPr lang="en-US" dirty="0" smtClean="0"/>
+              <a:t> endpoints could be used</a:t>
+            </a:r>
+          </a:p>
+          <a:p>
+            <a:r>
+              <a:rPr lang="en-US" dirty="0" smtClean="0"/>
+              <a:t>Extensible Algorithm for detecting issues with medical orders</a:t>
+            </a:r>
+          </a:p>
+          <a:p>
+            <a:r>
+              <a:rPr lang="en-US" dirty="0" smtClean="0"/>
+              <a:t>Decoupled MVC based architecture</a:t>
+            </a:r>
+            <a:endParaRPr lang="en-US" dirty="0"/>
+          </a:p>
+        </p:txBody>
+      </p:sp>
+    </p:spTree>
+    <p:extLst>
+      <p:ext uri="{BB962C8B-B14F-4D97-AF65-F5344CB8AC3E}">
+        <p14:creationId xmlns:p14="http://schemas.microsoft.com/office/powerpoint/2010/main" val="3048411862"/>
+      </p:ext>
+    </p:extLst>
+  </p:cSld>
+  <p:clrMapOvr>
+    <a:masterClrMapping/>
+  </p:clrMapOvr>
+  <p:transition spd="slow">
+    <p:fade/>
+  </p:transition>
+  <p:timing>
+    <p:tnLst>
+      <p:par>
+        <p:cTn id="1" dur="indefinite" restart="never" nodeType="tmRoot"/>
+      </p:par>
+    </p:tnLst>
+  </p:timing>
+</p:sld>
+</file>
+
+<file path=ppt/slides/slide5.xml><?xml version="1.0" encoding="utf-8"?>
+<p:sld xmlns:a="http://schemas.openxmlformats.org/drawingml/2006/main" xmlns:r="http://schemas.openxmlformats.org/officeDocument/2006/relationships" xmlns:p="http://schemas.openxmlformats.org/presentationml/2006/main">
+  <p:cSld>
+    <p:spTree>
+      <p:nvGrpSpPr>
+        <p:cNvPr id="1" name=""/>
+        <p:cNvGrpSpPr/>
+        <p:nvPr/>
+      </p:nvGrpSpPr>
+      <p:grpSpPr>
+        <a:xfrm>
+          <a:off x="0" y="0"/>
+          <a:ext cx="0" cy="0"/>
+          <a:chOff x="0" y="0"/>
+          <a:chExt cx="0" cy="0"/>
+        </a:xfrm>
+      </p:grpSpPr>
+      <p:sp>
+        <p:nvSpPr>
+          <p:cNvPr id="2" name="Title 1"/>
+          <p:cNvSpPr>
+            <a:spLocks noGrp="1"/>
+          </p:cNvSpPr>
+          <p:nvPr>
+            <p:ph type="title"/>
+          </p:nvPr>
+        </p:nvSpPr>
+        <p:spPr/>
+        <p:txBody>
+          <a:bodyPr/>
+          <a:lstStyle/>
+          <a:p>
+            <a:r>
+              <a:rPr lang="en-US" dirty="0" smtClean="0"/>
+              <a:t>Future Opportunities</a:t>
+            </a:r>
+            <a:endParaRPr lang="en-US" dirty="0"/>
+          </a:p>
+        </p:txBody>
+      </p:sp>
+      <p:sp>
+        <p:nvSpPr>
+          <p:cNvPr id="3" name="Content Placeholder 2"/>
+          <p:cNvSpPr>
+            <a:spLocks noGrp="1"/>
+          </p:cNvSpPr>
+          <p:nvPr>
+            <p:ph idx="1"/>
+          </p:nvPr>
+        </p:nvSpPr>
+        <p:spPr/>
+        <p:txBody>
+          <a:bodyPr/>
+          <a:lstStyle/>
+          <a:p>
+            <a:r>
+              <a:rPr lang="en-US" dirty="0" smtClean="0"/>
+              <a:t>Dietary </a:t>
+            </a:r>
+            <a:r>
+              <a:rPr lang="en-US" dirty="0" err="1" smtClean="0"/>
+              <a:t>fitbit</a:t>
+            </a:r>
+            <a:r>
+              <a:rPr lang="en-US" dirty="0" smtClean="0"/>
+              <a:t> data could be used for better medical analysis, like how certain foods interact with certain medications</a:t>
+            </a:r>
+          </a:p>
+          <a:p>
+            <a:r>
+              <a:rPr lang="en-US" dirty="0" smtClean="0"/>
+              <a:t>Allow staff to view other </a:t>
+            </a:r>
+            <a:r>
+              <a:rPr lang="en-US" dirty="0" err="1" smtClean="0"/>
+              <a:t>fitbit</a:t>
+            </a:r>
+            <a:r>
+              <a:rPr lang="en-US" dirty="0" smtClean="0"/>
+              <a:t> data like weight, height, etc. </a:t>
+            </a:r>
+          </a:p>
+          <a:p>
+            <a:r>
+              <a:rPr lang="en-US" dirty="0" smtClean="0"/>
+              <a:t>Allow staff to provide feedback on current dietary information</a:t>
+            </a:r>
+          </a:p>
+          <a:p>
+            <a:r>
+              <a:rPr lang="en-US" dirty="0" smtClean="0"/>
+              <a:t>Allow other EHR’s to plugin to the service</a:t>
+            </a:r>
+            <a:endParaRPr lang="en-US" dirty="0"/>
+          </a:p>
+        </p:txBody>
+      </p:sp>
+    </p:spTree>
+    <p:extLst>
+      <p:ext uri="{BB962C8B-B14F-4D97-AF65-F5344CB8AC3E}">
+        <p14:creationId xmlns:p14="http://schemas.microsoft.com/office/powerpoint/2010/main" val="987584014"/>
+      </p:ext>
+    </p:extLst>
+  </p:cSld>
+  <p:clrMapOvr>
+    <a:masterClrMapping/>
+  </p:clrMapOvr>
+  <p:transition spd="slow">
+    <p:fade/>
+  </p:transition>
+  <p:timing>
+    <p:tnLst>
+      <p:par>
+        <p:cTn id="1" dur="indefinite" restart="never" nodeType="tmRoot"/>
+      </p:par>
+    </p:tnLst>
+  </p:timing>
+</p:sld>
+</file>
+
+<file path=ppt/slides/slide6.xml><?xml version="1.0" encoding="utf-8"?>
+<p:sld xmlns:a="http://schemas.openxmlformats.org/drawingml/2006/main" xmlns:r="http://schemas.openxmlformats.org/officeDocument/2006/relationships" xmlns:p="http://schemas.openxmlformats.org/presentationml/2006/main">
+  <p:cSld>
+    <p:spTree>
+      <p:nvGrpSpPr>
+        <p:cNvPr id="1" name=""/>
+        <p:cNvGrpSpPr/>
+        <p:nvPr/>
+      </p:nvGrpSpPr>
+      <p:grpSpPr>
+        <a:xfrm>
+          <a:off x="0" y="0"/>
+          <a:ext cx="0" cy="0"/>
+          <a:chOff x="0" y="0"/>
+          <a:chExt cx="0" cy="0"/>
+        </a:xfrm>
+      </p:grpSpPr>
+      <p:sp>
+        <p:nvSpPr>
+          <p:cNvPr id="2" name="Title 1"/>
+          <p:cNvSpPr>
+            <a:spLocks noGrp="1"/>
+          </p:cNvSpPr>
+          <p:nvPr>
+            <p:ph type="title"/>
+          </p:nvPr>
+        </p:nvSpPr>
+        <p:spPr/>
+        <p:txBody>
+          <a:bodyPr/>
+          <a:lstStyle/>
+          <a:p>
+            <a:r>
+              <a:rPr lang="en-US" dirty="0" smtClean="0"/>
               <a:t>Final Gantt Chart</a:t>
             </a:r>
             <a:endParaRPr lang="en-US" dirty="0"/>
@@ -5582,10 +5978,1937 @@
   <p:transition spd="slow">
     <p:fade/>
   </p:transition>
+  <p:timing>
+    <p:tnLst>
+      <p:par>
+        <p:cTn id="1" dur="indefinite" restart="never" nodeType="tmRoot"/>
+      </p:par>
+    </p:tnLst>
+  </p:timing>
 </p:sld>
 </file>
 
-<file path=ppt/slides/slide4.xml><?xml version="1.0" encoding="utf-8"?>
+<file path=ppt/slides/slide7.xml><?xml version="1.0" encoding="utf-8"?>
+<p:sld xmlns:a="http://schemas.openxmlformats.org/drawingml/2006/main" xmlns:r="http://schemas.openxmlformats.org/officeDocument/2006/relationships" xmlns:p="http://schemas.openxmlformats.org/presentationml/2006/main">
+  <p:cSld>
+    <p:spTree>
+      <p:nvGrpSpPr>
+        <p:cNvPr id="1" name=""/>
+        <p:cNvGrpSpPr/>
+        <p:nvPr/>
+      </p:nvGrpSpPr>
+      <p:grpSpPr>
+        <a:xfrm>
+          <a:off x="0" y="0"/>
+          <a:ext cx="0" cy="0"/>
+          <a:chOff x="0" y="0"/>
+          <a:chExt cx="0" cy="0"/>
+        </a:xfrm>
+      </p:grpSpPr>
+      <p:sp>
+        <p:nvSpPr>
+          <p:cNvPr id="2" name="Title 1"/>
+          <p:cNvSpPr>
+            <a:spLocks noGrp="1"/>
+          </p:cNvSpPr>
+          <p:nvPr>
+            <p:ph type="title"/>
+          </p:nvPr>
+        </p:nvSpPr>
+        <p:spPr/>
+        <p:txBody>
+          <a:bodyPr/>
+          <a:lstStyle/>
+          <a:p>
+            <a:r>
+              <a:rPr lang="en-US" dirty="0" smtClean="0"/>
+              <a:t>Architecture</a:t>
+            </a:r>
+            <a:endParaRPr lang="en-US" dirty="0"/>
+          </a:p>
+        </p:txBody>
+      </p:sp>
+      <p:sp>
+        <p:nvSpPr>
+          <p:cNvPr id="92" name="Flowchart: Process 91"/>
+          <p:cNvSpPr/>
+          <p:nvPr/>
+        </p:nvSpPr>
+        <p:spPr>
+          <a:xfrm>
+            <a:off x="136526" y="1524000"/>
+            <a:ext cx="3430586" cy="2724943"/>
+          </a:xfrm>
+          <a:prstGeom prst="flowChartProcess">
+            <a:avLst/>
+          </a:prstGeom>
+          <a:ln>
+            <a:solidFill>
+              <a:schemeClr val="tx1"/>
+            </a:solidFill>
+            <a:prstDash val="sysDash"/>
+          </a:ln>
+        </p:spPr>
+        <p:style>
+          <a:lnRef idx="2">
+            <a:schemeClr val="accent3">
+              <a:shade val="50000"/>
+            </a:schemeClr>
+          </a:lnRef>
+          <a:fillRef idx="1">
+            <a:schemeClr val="accent3"/>
+          </a:fillRef>
+          <a:effectRef idx="0">
+            <a:schemeClr val="accent3"/>
+          </a:effectRef>
+          <a:fontRef idx="minor">
+            <a:schemeClr val="lt1"/>
+          </a:fontRef>
+        </p:style>
+        <p:txBody>
+          <a:bodyPr rtlCol="0" anchor="ctr"/>
+          <a:lstStyle/>
+          <a:p>
+            <a:pPr algn="ctr"/>
+            <a:endParaRPr lang="en-US"/>
+          </a:p>
+        </p:txBody>
+      </p:sp>
+      <p:sp>
+        <p:nvSpPr>
+          <p:cNvPr id="93" name="Title 1"/>
+          <p:cNvSpPr txBox="1">
+            <a:spLocks/>
+          </p:cNvSpPr>
+          <p:nvPr/>
+        </p:nvSpPr>
+        <p:spPr>
+          <a:xfrm>
+            <a:off x="457200" y="914400"/>
+            <a:ext cx="8229600" cy="914400"/>
+          </a:xfrm>
+          <a:prstGeom prst="rect">
+            <a:avLst/>
+          </a:prstGeom>
+        </p:spPr>
+        <p:txBody>
+          <a:bodyPr vert="horz" lIns="91440" tIns="45720" rIns="91440" bIns="45720" rtlCol="0" anchor="t">
+            <a:normAutofit/>
+          </a:bodyPr>
+          <a:lstStyle>
+            <a:lvl1pPr algn="l" defTabSz="914400" rtl="0" eaLnBrk="1" latinLnBrk="0" hangingPunct="1">
+              <a:spcBef>
+                <a:spcPct val="0"/>
+              </a:spcBef>
+              <a:buNone/>
+              <a:defRPr sz="2800" kern="1200">
+                <a:solidFill>
+                  <a:schemeClr val="tx1"/>
+                </a:solidFill>
+                <a:latin typeface="Georgia" pitchFamily="18" charset="0"/>
+                <a:ea typeface="+mj-ea"/>
+                <a:cs typeface="+mj-cs"/>
+              </a:defRPr>
+            </a:lvl1pPr>
+          </a:lstStyle>
+          <a:p>
+            <a:r>
+              <a:rPr lang="en-US" smtClean="0"/>
+              <a:t>Architecture</a:t>
+            </a:r>
+            <a:endParaRPr lang="en-US" dirty="0"/>
+          </a:p>
+        </p:txBody>
+      </p:sp>
+      <p:sp>
+        <p:nvSpPr>
+          <p:cNvPr id="94" name="Can 93"/>
+          <p:cNvSpPr/>
+          <p:nvPr/>
+        </p:nvSpPr>
+        <p:spPr>
+          <a:xfrm>
+            <a:off x="654050" y="5130800"/>
+            <a:ext cx="1752600" cy="1447800"/>
+          </a:xfrm>
+          <a:prstGeom prst="can">
+            <a:avLst/>
+          </a:prstGeom>
+        </p:spPr>
+        <p:style>
+          <a:lnRef idx="2">
+            <a:schemeClr val="accent1">
+              <a:shade val="50000"/>
+            </a:schemeClr>
+          </a:lnRef>
+          <a:fillRef idx="1">
+            <a:schemeClr val="accent1"/>
+          </a:fillRef>
+          <a:effectRef idx="0">
+            <a:schemeClr val="accent1"/>
+          </a:effectRef>
+          <a:fontRef idx="minor">
+            <a:schemeClr val="lt1"/>
+          </a:fontRef>
+        </p:style>
+        <p:txBody>
+          <a:bodyPr rtlCol="0" anchor="ctr"/>
+          <a:lstStyle/>
+          <a:p>
+            <a:pPr algn="ctr"/>
+            <a:r>
+              <a:rPr lang="en-US" dirty="0" smtClean="0"/>
+              <a:t>FHIR DB</a:t>
+            </a:r>
+            <a:endParaRPr lang="en-US" dirty="0"/>
+          </a:p>
+        </p:txBody>
+      </p:sp>
+      <p:sp>
+        <p:nvSpPr>
+          <p:cNvPr id="95" name="Can 94"/>
+          <p:cNvSpPr/>
+          <p:nvPr/>
+        </p:nvSpPr>
+        <p:spPr>
+          <a:xfrm>
+            <a:off x="7053262" y="5156508"/>
+            <a:ext cx="1790700" cy="1435100"/>
+          </a:xfrm>
+          <a:prstGeom prst="can">
+            <a:avLst/>
+          </a:prstGeom>
+        </p:spPr>
+        <p:style>
+          <a:lnRef idx="2">
+            <a:schemeClr val="accent1">
+              <a:shade val="50000"/>
+            </a:schemeClr>
+          </a:lnRef>
+          <a:fillRef idx="1">
+            <a:schemeClr val="accent1"/>
+          </a:fillRef>
+          <a:effectRef idx="0">
+            <a:schemeClr val="accent1"/>
+          </a:effectRef>
+          <a:fontRef idx="minor">
+            <a:schemeClr val="lt1"/>
+          </a:fontRef>
+        </p:style>
+        <p:txBody>
+          <a:bodyPr rtlCol="0" anchor="ctr"/>
+          <a:lstStyle/>
+          <a:p>
+            <a:pPr algn="ctr"/>
+            <a:r>
+              <a:rPr lang="en-US" dirty="0" smtClean="0"/>
+              <a:t>Patient Data Repository</a:t>
+            </a:r>
+            <a:endParaRPr lang="en-US" dirty="0"/>
+          </a:p>
+        </p:txBody>
+      </p:sp>
+      <p:grpSp>
+        <p:nvGrpSpPr>
+          <p:cNvPr id="96" name="Group 95"/>
+          <p:cNvGrpSpPr/>
+          <p:nvPr/>
+        </p:nvGrpSpPr>
+        <p:grpSpPr>
+          <a:xfrm>
+            <a:off x="2819400" y="5143500"/>
+            <a:ext cx="2260600" cy="1435100"/>
+            <a:chOff x="2743200" y="2978150"/>
+            <a:chExt cx="2260600" cy="1435100"/>
+          </a:xfrm>
+        </p:grpSpPr>
+        <p:sp>
+          <p:nvSpPr>
+            <p:cNvPr id="97" name="Can 96"/>
+            <p:cNvSpPr/>
+            <p:nvPr/>
+          </p:nvSpPr>
+          <p:spPr>
+            <a:xfrm>
+              <a:off x="3213100" y="2978150"/>
+              <a:ext cx="1790700" cy="1435100"/>
+            </a:xfrm>
+            <a:prstGeom prst="can">
+              <a:avLst/>
+            </a:prstGeom>
+          </p:spPr>
+          <p:style>
+            <a:lnRef idx="2">
+              <a:schemeClr val="accent1">
+                <a:shade val="50000"/>
+              </a:schemeClr>
+            </a:lnRef>
+            <a:fillRef idx="1">
+              <a:schemeClr val="accent1"/>
+            </a:fillRef>
+            <a:effectRef idx="0">
+              <a:schemeClr val="accent1"/>
+            </a:effectRef>
+            <a:fontRef idx="minor">
+              <a:schemeClr val="lt1"/>
+            </a:fontRef>
+          </p:style>
+          <p:txBody>
+            <a:bodyPr rtlCol="0" anchor="ctr"/>
+            <a:lstStyle/>
+            <a:p>
+              <a:pPr algn="ctr"/>
+              <a:r>
+                <a:rPr lang="en-US" dirty="0" smtClean="0"/>
+                <a:t>EHR Repository</a:t>
+              </a:r>
+              <a:endParaRPr lang="en-US" dirty="0"/>
+            </a:p>
+          </p:txBody>
+        </p:sp>
+        <p:sp>
+          <p:nvSpPr>
+            <p:cNvPr id="98" name="Can 97"/>
+            <p:cNvSpPr/>
+            <p:nvPr/>
+          </p:nvSpPr>
+          <p:spPr>
+            <a:xfrm>
+              <a:off x="3048000" y="2978150"/>
+              <a:ext cx="1790700" cy="1435100"/>
+            </a:xfrm>
+            <a:prstGeom prst="can">
+              <a:avLst/>
+            </a:prstGeom>
+          </p:spPr>
+          <p:style>
+            <a:lnRef idx="2">
+              <a:schemeClr val="accent1">
+                <a:shade val="50000"/>
+              </a:schemeClr>
+            </a:lnRef>
+            <a:fillRef idx="1">
+              <a:schemeClr val="accent1"/>
+            </a:fillRef>
+            <a:effectRef idx="0">
+              <a:schemeClr val="accent1"/>
+            </a:effectRef>
+            <a:fontRef idx="minor">
+              <a:schemeClr val="lt1"/>
+            </a:fontRef>
+          </p:style>
+          <p:txBody>
+            <a:bodyPr rtlCol="0" anchor="ctr"/>
+            <a:lstStyle/>
+            <a:p>
+              <a:pPr algn="ctr"/>
+              <a:r>
+                <a:rPr lang="en-US" dirty="0" smtClean="0"/>
+                <a:t>EHR Repository</a:t>
+              </a:r>
+              <a:endParaRPr lang="en-US" dirty="0"/>
+            </a:p>
+          </p:txBody>
+        </p:sp>
+        <p:sp>
+          <p:nvSpPr>
+            <p:cNvPr id="99" name="Can 98"/>
+            <p:cNvSpPr/>
+            <p:nvPr/>
+          </p:nvSpPr>
+          <p:spPr>
+            <a:xfrm>
+              <a:off x="2895600" y="2978150"/>
+              <a:ext cx="1790700" cy="1435100"/>
+            </a:xfrm>
+            <a:prstGeom prst="can">
+              <a:avLst/>
+            </a:prstGeom>
+          </p:spPr>
+          <p:style>
+            <a:lnRef idx="2">
+              <a:schemeClr val="accent1">
+                <a:shade val="50000"/>
+              </a:schemeClr>
+            </a:lnRef>
+            <a:fillRef idx="1">
+              <a:schemeClr val="accent1"/>
+            </a:fillRef>
+            <a:effectRef idx="0">
+              <a:schemeClr val="accent1"/>
+            </a:effectRef>
+            <a:fontRef idx="minor">
+              <a:schemeClr val="lt1"/>
+            </a:fontRef>
+          </p:style>
+          <p:txBody>
+            <a:bodyPr rtlCol="0" anchor="ctr"/>
+            <a:lstStyle/>
+            <a:p>
+              <a:pPr algn="ctr"/>
+              <a:r>
+                <a:rPr lang="en-US" dirty="0" smtClean="0"/>
+                <a:t>EHR Repositories</a:t>
+              </a:r>
+              <a:endParaRPr lang="en-US" dirty="0"/>
+            </a:p>
+          </p:txBody>
+        </p:sp>
+        <p:sp>
+          <p:nvSpPr>
+            <p:cNvPr id="100" name="Can 99"/>
+            <p:cNvSpPr/>
+            <p:nvPr/>
+          </p:nvSpPr>
+          <p:spPr>
+            <a:xfrm>
+              <a:off x="2743200" y="2978150"/>
+              <a:ext cx="1790700" cy="1435100"/>
+            </a:xfrm>
+            <a:prstGeom prst="can">
+              <a:avLst/>
+            </a:prstGeom>
+          </p:spPr>
+          <p:style>
+            <a:lnRef idx="2">
+              <a:schemeClr val="accent1">
+                <a:shade val="50000"/>
+              </a:schemeClr>
+            </a:lnRef>
+            <a:fillRef idx="1">
+              <a:schemeClr val="accent1"/>
+            </a:fillRef>
+            <a:effectRef idx="0">
+              <a:schemeClr val="accent1"/>
+            </a:effectRef>
+            <a:fontRef idx="minor">
+              <a:schemeClr val="lt1"/>
+            </a:fontRef>
+          </p:style>
+          <p:txBody>
+            <a:bodyPr rtlCol="0" anchor="ctr"/>
+            <a:lstStyle/>
+            <a:p>
+              <a:pPr algn="ctr"/>
+              <a:r>
+                <a:rPr lang="en-US" dirty="0" smtClean="0"/>
+                <a:t>EHR Repositories</a:t>
+              </a:r>
+              <a:endParaRPr lang="en-US" dirty="0"/>
+            </a:p>
+          </p:txBody>
+        </p:sp>
+      </p:grpSp>
+      <p:sp>
+        <p:nvSpPr>
+          <p:cNvPr id="101" name="Rectangle 100"/>
+          <p:cNvSpPr/>
+          <p:nvPr/>
+        </p:nvSpPr>
+        <p:spPr>
+          <a:xfrm>
+            <a:off x="606425" y="4419600"/>
+            <a:ext cx="4071937" cy="533400"/>
+          </a:xfrm>
+          <a:prstGeom prst="rect">
+            <a:avLst/>
+          </a:prstGeom>
+          <a:solidFill>
+            <a:schemeClr val="accent1"/>
+          </a:solidFill>
+        </p:spPr>
+        <p:style>
+          <a:lnRef idx="2">
+            <a:schemeClr val="accent3">
+              <a:shade val="50000"/>
+            </a:schemeClr>
+          </a:lnRef>
+          <a:fillRef idx="1">
+            <a:schemeClr val="accent3"/>
+          </a:fillRef>
+          <a:effectRef idx="0">
+            <a:schemeClr val="accent3"/>
+          </a:effectRef>
+          <a:fontRef idx="minor">
+            <a:schemeClr val="lt1"/>
+          </a:fontRef>
+        </p:style>
+        <p:txBody>
+          <a:bodyPr rtlCol="0" anchor="ctr"/>
+          <a:lstStyle/>
+          <a:p>
+            <a:pPr algn="ctr"/>
+            <a:r>
+              <a:rPr lang="en-US" dirty="0" smtClean="0"/>
+              <a:t>Public Interface</a:t>
+            </a:r>
+            <a:endParaRPr lang="en-US" dirty="0"/>
+          </a:p>
+        </p:txBody>
+      </p:sp>
+      <p:sp>
+        <p:nvSpPr>
+          <p:cNvPr id="102" name="Up Arrow 101"/>
+          <p:cNvSpPr/>
+          <p:nvPr/>
+        </p:nvSpPr>
+        <p:spPr>
+          <a:xfrm>
+            <a:off x="3475830" y="4953000"/>
+            <a:ext cx="469900" cy="381000"/>
+          </a:xfrm>
+          <a:prstGeom prst="upArrow">
+            <a:avLst/>
+          </a:prstGeom>
+        </p:spPr>
+        <p:style>
+          <a:lnRef idx="2">
+            <a:schemeClr val="dk1">
+              <a:shade val="50000"/>
+            </a:schemeClr>
+          </a:lnRef>
+          <a:fillRef idx="1">
+            <a:schemeClr val="dk1"/>
+          </a:fillRef>
+          <a:effectRef idx="0">
+            <a:schemeClr val="dk1"/>
+          </a:effectRef>
+          <a:fontRef idx="minor">
+            <a:schemeClr val="lt1"/>
+          </a:fontRef>
+        </p:style>
+        <p:txBody>
+          <a:bodyPr rtlCol="0" anchor="ctr"/>
+          <a:lstStyle/>
+          <a:p>
+            <a:pPr algn="ctr"/>
+            <a:endParaRPr lang="en-US"/>
+          </a:p>
+        </p:txBody>
+      </p:sp>
+      <p:sp>
+        <p:nvSpPr>
+          <p:cNvPr id="103" name="Up Arrow 102"/>
+          <p:cNvSpPr/>
+          <p:nvPr/>
+        </p:nvSpPr>
+        <p:spPr>
+          <a:xfrm>
+            <a:off x="896081" y="4971172"/>
+            <a:ext cx="469900" cy="381000"/>
+          </a:xfrm>
+          <a:prstGeom prst="upArrow">
+            <a:avLst/>
+          </a:prstGeom>
+        </p:spPr>
+        <p:style>
+          <a:lnRef idx="2">
+            <a:schemeClr val="dk1">
+              <a:shade val="50000"/>
+            </a:schemeClr>
+          </a:lnRef>
+          <a:fillRef idx="1">
+            <a:schemeClr val="dk1"/>
+          </a:fillRef>
+          <a:effectRef idx="0">
+            <a:schemeClr val="dk1"/>
+          </a:effectRef>
+          <a:fontRef idx="minor">
+            <a:schemeClr val="lt1"/>
+          </a:fontRef>
+        </p:style>
+        <p:txBody>
+          <a:bodyPr rtlCol="0" anchor="ctr"/>
+          <a:lstStyle/>
+          <a:p>
+            <a:pPr algn="ctr"/>
+            <a:endParaRPr lang="en-US"/>
+          </a:p>
+        </p:txBody>
+      </p:sp>
+      <p:sp>
+        <p:nvSpPr>
+          <p:cNvPr id="104" name="Flowchart: Process 103"/>
+          <p:cNvSpPr/>
+          <p:nvPr/>
+        </p:nvSpPr>
+        <p:spPr>
+          <a:xfrm>
+            <a:off x="606425" y="3562350"/>
+            <a:ext cx="2774950" cy="533400"/>
+          </a:xfrm>
+          <a:prstGeom prst="flowChartProcess">
+            <a:avLst/>
+          </a:prstGeom>
+        </p:spPr>
+        <p:style>
+          <a:lnRef idx="2">
+            <a:schemeClr val="dk1"/>
+          </a:lnRef>
+          <a:fillRef idx="1">
+            <a:schemeClr val="lt1"/>
+          </a:fillRef>
+          <a:effectRef idx="0">
+            <a:schemeClr val="dk1"/>
+          </a:effectRef>
+          <a:fontRef idx="minor">
+            <a:schemeClr val="dk1"/>
+          </a:fontRef>
+        </p:style>
+        <p:txBody>
+          <a:bodyPr rtlCol="0" anchor="ctr"/>
+          <a:lstStyle/>
+          <a:p>
+            <a:pPr algn="ctr"/>
+            <a:r>
+              <a:rPr lang="en-US" dirty="0" smtClean="0"/>
+              <a:t>EHR Provider Plugin</a:t>
+            </a:r>
+            <a:endParaRPr lang="en-US" dirty="0"/>
+          </a:p>
+        </p:txBody>
+      </p:sp>
+      <p:sp>
+        <p:nvSpPr>
+          <p:cNvPr id="105" name="Rectangle 104"/>
+          <p:cNvSpPr/>
+          <p:nvPr/>
+        </p:nvSpPr>
+        <p:spPr>
+          <a:xfrm>
+            <a:off x="4943475" y="4419600"/>
+            <a:ext cx="3362325" cy="533400"/>
+          </a:xfrm>
+          <a:prstGeom prst="rect">
+            <a:avLst/>
+          </a:prstGeom>
+          <a:solidFill>
+            <a:schemeClr val="accent1"/>
+          </a:solidFill>
+        </p:spPr>
+        <p:style>
+          <a:lnRef idx="2">
+            <a:schemeClr val="accent2">
+              <a:shade val="50000"/>
+            </a:schemeClr>
+          </a:lnRef>
+          <a:fillRef idx="1">
+            <a:schemeClr val="accent2"/>
+          </a:fillRef>
+          <a:effectRef idx="0">
+            <a:schemeClr val="accent2"/>
+          </a:effectRef>
+          <a:fontRef idx="minor">
+            <a:schemeClr val="lt1"/>
+          </a:fontRef>
+        </p:style>
+        <p:txBody>
+          <a:bodyPr rtlCol="0" anchor="ctr"/>
+          <a:lstStyle/>
+          <a:p>
+            <a:pPr algn="ctr"/>
+            <a:r>
+              <a:rPr lang="en-US" dirty="0" smtClean="0"/>
+              <a:t>Patient  Data Interface</a:t>
+            </a:r>
+            <a:endParaRPr lang="en-US" dirty="0"/>
+          </a:p>
+        </p:txBody>
+      </p:sp>
+      <p:grpSp>
+        <p:nvGrpSpPr>
+          <p:cNvPr id="106" name="Group 105"/>
+          <p:cNvGrpSpPr/>
+          <p:nvPr/>
+        </p:nvGrpSpPr>
+        <p:grpSpPr>
+          <a:xfrm>
+            <a:off x="3695700" y="2130425"/>
+            <a:ext cx="2133600" cy="1898650"/>
+            <a:chOff x="4216400" y="2419350"/>
+            <a:chExt cx="2133600" cy="1898650"/>
+          </a:xfrm>
+        </p:grpSpPr>
+        <p:sp>
+          <p:nvSpPr>
+            <p:cNvPr id="107" name="Rectangle 106"/>
+            <p:cNvSpPr/>
+            <p:nvPr/>
+          </p:nvSpPr>
+          <p:spPr>
+            <a:xfrm>
+              <a:off x="4216400" y="2419350"/>
+              <a:ext cx="2133600" cy="723900"/>
+            </a:xfrm>
+            <a:prstGeom prst="rect">
+              <a:avLst/>
+            </a:prstGeom>
+            <a:solidFill>
+              <a:schemeClr val="accent1"/>
+            </a:solidFill>
+          </p:spPr>
+          <p:style>
+            <a:lnRef idx="2">
+              <a:schemeClr val="accent2">
+                <a:shade val="50000"/>
+              </a:schemeClr>
+            </a:lnRef>
+            <a:fillRef idx="1">
+              <a:schemeClr val="accent2"/>
+            </a:fillRef>
+            <a:effectRef idx="0">
+              <a:schemeClr val="accent2"/>
+            </a:effectRef>
+            <a:fontRef idx="minor">
+              <a:schemeClr val="lt1"/>
+            </a:fontRef>
+          </p:style>
+          <p:txBody>
+            <a:bodyPr rtlCol="0" anchor="ctr"/>
+            <a:lstStyle/>
+            <a:p>
+              <a:pPr algn="ctr"/>
+              <a:r>
+                <a:rPr lang="en-US" dirty="0" smtClean="0"/>
+                <a:t>Alert Service</a:t>
+              </a:r>
+              <a:endParaRPr lang="en-US" dirty="0"/>
+            </a:p>
+          </p:txBody>
+        </p:sp>
+        <p:sp>
+          <p:nvSpPr>
+            <p:cNvPr id="108" name="Rectangle 107"/>
+            <p:cNvSpPr/>
+            <p:nvPr/>
+          </p:nvSpPr>
+          <p:spPr>
+            <a:xfrm>
+              <a:off x="4216400" y="3143250"/>
+              <a:ext cx="2133600" cy="685800"/>
+            </a:xfrm>
+            <a:prstGeom prst="rect">
+              <a:avLst/>
+            </a:prstGeom>
+            <a:solidFill>
+              <a:schemeClr val="accent1"/>
+            </a:solidFill>
+          </p:spPr>
+          <p:style>
+            <a:lnRef idx="2">
+              <a:schemeClr val="accent2">
+                <a:shade val="50000"/>
+              </a:schemeClr>
+            </a:lnRef>
+            <a:fillRef idx="1">
+              <a:schemeClr val="accent2"/>
+            </a:fillRef>
+            <a:effectRef idx="0">
+              <a:schemeClr val="accent2"/>
+            </a:effectRef>
+            <a:fontRef idx="minor">
+              <a:schemeClr val="lt1"/>
+            </a:fontRef>
+          </p:style>
+          <p:txBody>
+            <a:bodyPr rtlCol="0" anchor="ctr"/>
+            <a:lstStyle/>
+            <a:p>
+              <a:pPr algn="ctr"/>
+              <a:r>
+                <a:rPr lang="en-US" dirty="0" smtClean="0"/>
+                <a:t>Treatment Plan Service</a:t>
+              </a:r>
+              <a:endParaRPr lang="en-US" dirty="0"/>
+            </a:p>
+          </p:txBody>
+        </p:sp>
+        <p:sp>
+          <p:nvSpPr>
+            <p:cNvPr id="109" name="Rectangle 108"/>
+            <p:cNvSpPr/>
+            <p:nvPr/>
+          </p:nvSpPr>
+          <p:spPr>
+            <a:xfrm>
+              <a:off x="4216400" y="3784600"/>
+              <a:ext cx="2133600" cy="533400"/>
+            </a:xfrm>
+            <a:prstGeom prst="rect">
+              <a:avLst/>
+            </a:prstGeom>
+          </p:spPr>
+          <p:style>
+            <a:lnRef idx="2">
+              <a:schemeClr val="dk1"/>
+            </a:lnRef>
+            <a:fillRef idx="1">
+              <a:schemeClr val="lt1"/>
+            </a:fillRef>
+            <a:effectRef idx="0">
+              <a:schemeClr val="dk1"/>
+            </a:effectRef>
+            <a:fontRef idx="minor">
+              <a:schemeClr val="dk1"/>
+            </a:fontRef>
+          </p:style>
+          <p:txBody>
+            <a:bodyPr rtlCol="0" anchor="ctr"/>
+            <a:lstStyle/>
+            <a:p>
+              <a:pPr algn="ctr"/>
+              <a:r>
+                <a:rPr lang="en-US" dirty="0" smtClean="0"/>
+                <a:t>Decider Process</a:t>
+              </a:r>
+              <a:endParaRPr lang="en-US" dirty="0"/>
+            </a:p>
+          </p:txBody>
+        </p:sp>
+      </p:grpSp>
+      <p:sp>
+        <p:nvSpPr>
+          <p:cNvPr id="110" name="Up Arrow 109"/>
+          <p:cNvSpPr/>
+          <p:nvPr/>
+        </p:nvSpPr>
+        <p:spPr>
+          <a:xfrm>
+            <a:off x="4140200" y="4038600"/>
+            <a:ext cx="469900" cy="381000"/>
+          </a:xfrm>
+          <a:prstGeom prst="upArrow">
+            <a:avLst/>
+          </a:prstGeom>
+        </p:spPr>
+        <p:style>
+          <a:lnRef idx="2">
+            <a:schemeClr val="dk1">
+              <a:shade val="50000"/>
+            </a:schemeClr>
+          </a:lnRef>
+          <a:fillRef idx="1">
+            <a:schemeClr val="dk1"/>
+          </a:fillRef>
+          <a:effectRef idx="0">
+            <a:schemeClr val="dk1"/>
+          </a:effectRef>
+          <a:fontRef idx="minor">
+            <a:schemeClr val="lt1"/>
+          </a:fontRef>
+        </p:style>
+        <p:txBody>
+          <a:bodyPr rtlCol="0" anchor="ctr"/>
+          <a:lstStyle/>
+          <a:p>
+            <a:pPr algn="ctr"/>
+            <a:endParaRPr lang="en-US"/>
+          </a:p>
+        </p:txBody>
+      </p:sp>
+      <p:sp>
+        <p:nvSpPr>
+          <p:cNvPr id="111" name="Up Arrow 110"/>
+          <p:cNvSpPr/>
+          <p:nvPr/>
+        </p:nvSpPr>
+        <p:spPr>
+          <a:xfrm>
+            <a:off x="4967287" y="4038600"/>
+            <a:ext cx="469900" cy="381000"/>
+          </a:xfrm>
+          <a:prstGeom prst="upArrow">
+            <a:avLst/>
+          </a:prstGeom>
+        </p:spPr>
+        <p:style>
+          <a:lnRef idx="2">
+            <a:schemeClr val="dk1">
+              <a:shade val="50000"/>
+            </a:schemeClr>
+          </a:lnRef>
+          <a:fillRef idx="1">
+            <a:schemeClr val="dk1"/>
+          </a:fillRef>
+          <a:effectRef idx="0">
+            <a:schemeClr val="dk1"/>
+          </a:effectRef>
+          <a:fontRef idx="minor">
+            <a:schemeClr val="lt1"/>
+          </a:fontRef>
+        </p:style>
+        <p:txBody>
+          <a:bodyPr rtlCol="0" anchor="ctr"/>
+          <a:lstStyle/>
+          <a:p>
+            <a:pPr algn="ctr"/>
+            <a:endParaRPr lang="en-US"/>
+          </a:p>
+        </p:txBody>
+      </p:sp>
+      <p:sp>
+        <p:nvSpPr>
+          <p:cNvPr id="112" name="Rectangle 111"/>
+          <p:cNvSpPr/>
+          <p:nvPr/>
+        </p:nvSpPr>
+        <p:spPr>
+          <a:xfrm>
+            <a:off x="606425" y="2033588"/>
+            <a:ext cx="1374775" cy="1514475"/>
+          </a:xfrm>
+          <a:prstGeom prst="rect">
+            <a:avLst/>
+          </a:prstGeom>
+          <a:solidFill>
+            <a:schemeClr val="accent1"/>
+          </a:solidFill>
+        </p:spPr>
+        <p:style>
+          <a:lnRef idx="2">
+            <a:schemeClr val="accent2">
+              <a:shade val="50000"/>
+            </a:schemeClr>
+          </a:lnRef>
+          <a:fillRef idx="1">
+            <a:schemeClr val="accent2"/>
+          </a:fillRef>
+          <a:effectRef idx="0">
+            <a:schemeClr val="accent2"/>
+          </a:effectRef>
+          <a:fontRef idx="minor">
+            <a:schemeClr val="lt1"/>
+          </a:fontRef>
+        </p:style>
+        <p:txBody>
+          <a:bodyPr rtlCol="0" anchor="ctr"/>
+          <a:lstStyle/>
+          <a:p>
+            <a:pPr algn="ctr"/>
+            <a:r>
+              <a:rPr lang="en-US" dirty="0" smtClean="0"/>
+              <a:t>Patient Data Get/Set View</a:t>
+            </a:r>
+            <a:endParaRPr lang="en-US" dirty="0"/>
+          </a:p>
+        </p:txBody>
+      </p:sp>
+      <p:sp>
+        <p:nvSpPr>
+          <p:cNvPr id="113" name="Rectangle 112"/>
+          <p:cNvSpPr/>
+          <p:nvPr/>
+        </p:nvSpPr>
+        <p:spPr>
+          <a:xfrm>
+            <a:off x="1981200" y="2033588"/>
+            <a:ext cx="1400175" cy="1514475"/>
+          </a:xfrm>
+          <a:prstGeom prst="rect">
+            <a:avLst/>
+          </a:prstGeom>
+          <a:solidFill>
+            <a:schemeClr val="accent1"/>
+          </a:solidFill>
+        </p:spPr>
+        <p:style>
+          <a:lnRef idx="2">
+            <a:schemeClr val="accent2">
+              <a:shade val="50000"/>
+            </a:schemeClr>
+          </a:lnRef>
+          <a:fillRef idx="1">
+            <a:schemeClr val="accent2"/>
+          </a:fillRef>
+          <a:effectRef idx="0">
+            <a:schemeClr val="accent2"/>
+          </a:effectRef>
+          <a:fontRef idx="minor">
+            <a:schemeClr val="lt1"/>
+          </a:fontRef>
+        </p:style>
+        <p:txBody>
+          <a:bodyPr rtlCol="0" anchor="ctr"/>
+          <a:lstStyle/>
+          <a:p>
+            <a:pPr algn="ctr"/>
+            <a:r>
+              <a:rPr lang="en-US" dirty="0" smtClean="0"/>
+              <a:t>Calculate Optimal Treatment View</a:t>
+            </a:r>
+            <a:endParaRPr lang="en-US" dirty="0"/>
+          </a:p>
+        </p:txBody>
+      </p:sp>
+      <p:cxnSp>
+        <p:nvCxnSpPr>
+          <p:cNvPr id="114" name="Elbow Connector 113"/>
+          <p:cNvCxnSpPr>
+            <a:stCxn id="107" idx="1"/>
+            <a:endCxn id="112" idx="0"/>
+          </p:cNvCxnSpPr>
+          <p:nvPr/>
+        </p:nvCxnSpPr>
+        <p:spPr>
+          <a:xfrm rot="10800000">
+            <a:off x="1293814" y="2033589"/>
+            <a:ext cx="2401887" cy="458787"/>
+          </a:xfrm>
+          <a:prstGeom prst="bentConnector4">
+            <a:avLst>
+              <a:gd name="adj1" fmla="val 7667"/>
+              <a:gd name="adj2" fmla="val 149827"/>
+            </a:avLst>
+          </a:prstGeom>
+          <a:ln w="38100">
+            <a:tailEnd type="triangle"/>
+          </a:ln>
+        </p:spPr>
+        <p:style>
+          <a:lnRef idx="1">
+            <a:schemeClr val="dk1"/>
+          </a:lnRef>
+          <a:fillRef idx="0">
+            <a:schemeClr val="dk1"/>
+          </a:fillRef>
+          <a:effectRef idx="0">
+            <a:schemeClr val="dk1"/>
+          </a:effectRef>
+          <a:fontRef idx="minor">
+            <a:schemeClr val="tx1"/>
+          </a:fontRef>
+        </p:style>
+      </p:cxnSp>
+      <p:cxnSp>
+        <p:nvCxnSpPr>
+          <p:cNvPr id="115" name="Elbow Connector 114"/>
+          <p:cNvCxnSpPr>
+            <a:stCxn id="108" idx="1"/>
+            <a:endCxn id="113" idx="3"/>
+          </p:cNvCxnSpPr>
+          <p:nvPr/>
+        </p:nvCxnSpPr>
+        <p:spPr>
+          <a:xfrm rot="10800000">
+            <a:off x="3381376" y="2790827"/>
+            <a:ext cx="314325" cy="406399"/>
+          </a:xfrm>
+          <a:prstGeom prst="bentConnector3">
+            <a:avLst>
+              <a:gd name="adj1" fmla="val 50000"/>
+            </a:avLst>
+          </a:prstGeom>
+          <a:ln w="38100">
+            <a:tailEnd type="triangle"/>
+          </a:ln>
+        </p:spPr>
+        <p:style>
+          <a:lnRef idx="1">
+            <a:schemeClr val="dk1"/>
+          </a:lnRef>
+          <a:fillRef idx="0">
+            <a:schemeClr val="dk1"/>
+          </a:fillRef>
+          <a:effectRef idx="0">
+            <a:schemeClr val="dk1"/>
+          </a:effectRef>
+          <a:fontRef idx="minor">
+            <a:schemeClr val="tx1"/>
+          </a:fontRef>
+        </p:style>
+      </p:cxnSp>
+      <p:sp>
+        <p:nvSpPr>
+          <p:cNvPr id="116" name="Flowchart: Process 115"/>
+          <p:cNvSpPr/>
+          <p:nvPr/>
+        </p:nvSpPr>
+        <p:spPr>
+          <a:xfrm>
+            <a:off x="6105525" y="3562350"/>
+            <a:ext cx="2774950" cy="533400"/>
+          </a:xfrm>
+          <a:prstGeom prst="flowChartProcess">
+            <a:avLst/>
+          </a:prstGeom>
+        </p:spPr>
+        <p:style>
+          <a:lnRef idx="2">
+            <a:schemeClr val="dk1"/>
+          </a:lnRef>
+          <a:fillRef idx="1">
+            <a:schemeClr val="lt1"/>
+          </a:fillRef>
+          <a:effectRef idx="0">
+            <a:schemeClr val="dk1"/>
+          </a:effectRef>
+          <a:fontRef idx="minor">
+            <a:schemeClr val="dk1"/>
+          </a:fontRef>
+        </p:style>
+        <p:txBody>
+          <a:bodyPr rtlCol="0" anchor="ctr"/>
+          <a:lstStyle/>
+          <a:p>
+            <a:pPr algn="ctr"/>
+            <a:r>
+              <a:rPr lang="en-US" dirty="0" smtClean="0"/>
+              <a:t>Patient App</a:t>
+            </a:r>
+            <a:endParaRPr lang="en-US" dirty="0"/>
+          </a:p>
+        </p:txBody>
+      </p:sp>
+      <p:sp>
+        <p:nvSpPr>
+          <p:cNvPr id="117" name="Rectangle 116"/>
+          <p:cNvSpPr/>
+          <p:nvPr/>
+        </p:nvSpPr>
+        <p:spPr>
+          <a:xfrm>
+            <a:off x="6105525" y="2033588"/>
+            <a:ext cx="1374775" cy="1514475"/>
+          </a:xfrm>
+          <a:prstGeom prst="rect">
+            <a:avLst/>
+          </a:prstGeom>
+          <a:solidFill>
+            <a:schemeClr val="accent3"/>
+          </a:solidFill>
+        </p:spPr>
+        <p:style>
+          <a:lnRef idx="2">
+            <a:schemeClr val="accent2">
+              <a:shade val="50000"/>
+            </a:schemeClr>
+          </a:lnRef>
+          <a:fillRef idx="1">
+            <a:schemeClr val="accent2"/>
+          </a:fillRef>
+          <a:effectRef idx="0">
+            <a:schemeClr val="accent2"/>
+          </a:effectRef>
+          <a:fontRef idx="minor">
+            <a:schemeClr val="lt1"/>
+          </a:fontRef>
+        </p:style>
+        <p:txBody>
+          <a:bodyPr rtlCol="0" anchor="ctr"/>
+          <a:lstStyle/>
+          <a:p>
+            <a:pPr algn="ctr"/>
+            <a:r>
+              <a:rPr lang="en-US" dirty="0" smtClean="0"/>
+              <a:t>Data Entry </a:t>
+            </a:r>
+            <a:endParaRPr lang="en-US" dirty="0"/>
+          </a:p>
+        </p:txBody>
+      </p:sp>
+      <p:sp>
+        <p:nvSpPr>
+          <p:cNvPr id="118" name="Rectangle 117"/>
+          <p:cNvSpPr/>
+          <p:nvPr/>
+        </p:nvSpPr>
+        <p:spPr>
+          <a:xfrm>
+            <a:off x="7480300" y="2033588"/>
+            <a:ext cx="1400175" cy="1514475"/>
+          </a:xfrm>
+          <a:prstGeom prst="rect">
+            <a:avLst/>
+          </a:prstGeom>
+          <a:solidFill>
+            <a:schemeClr val="accent1"/>
+          </a:solidFill>
+        </p:spPr>
+        <p:style>
+          <a:lnRef idx="2">
+            <a:schemeClr val="accent2">
+              <a:shade val="50000"/>
+            </a:schemeClr>
+          </a:lnRef>
+          <a:fillRef idx="1">
+            <a:schemeClr val="accent2"/>
+          </a:fillRef>
+          <a:effectRef idx="0">
+            <a:schemeClr val="accent2"/>
+          </a:effectRef>
+          <a:fontRef idx="minor">
+            <a:schemeClr val="lt1"/>
+          </a:fontRef>
+        </p:style>
+        <p:txBody>
+          <a:bodyPr rtlCol="0" anchor="ctr"/>
+          <a:lstStyle/>
+          <a:p>
+            <a:pPr algn="ctr"/>
+            <a:r>
+              <a:rPr lang="en-US" dirty="0" smtClean="0"/>
+              <a:t>Plan </a:t>
+            </a:r>
+            <a:endParaRPr lang="en-US" dirty="0"/>
+          </a:p>
+        </p:txBody>
+      </p:sp>
+      <p:cxnSp>
+        <p:nvCxnSpPr>
+          <p:cNvPr id="119" name="Elbow Connector 118"/>
+          <p:cNvCxnSpPr>
+            <a:endCxn id="108" idx="3"/>
+          </p:cNvCxnSpPr>
+          <p:nvPr/>
+        </p:nvCxnSpPr>
+        <p:spPr>
+          <a:xfrm rot="10800000">
+            <a:off x="5829300" y="3197225"/>
+            <a:ext cx="269876" cy="103188"/>
+          </a:xfrm>
+          <a:prstGeom prst="bentConnector3">
+            <a:avLst>
+              <a:gd name="adj1" fmla="val 31177"/>
+            </a:avLst>
+          </a:prstGeom>
+          <a:ln w="38100">
+            <a:tailEnd type="triangle"/>
+          </a:ln>
+        </p:spPr>
+        <p:style>
+          <a:lnRef idx="1">
+            <a:schemeClr val="dk1"/>
+          </a:lnRef>
+          <a:fillRef idx="0">
+            <a:schemeClr val="dk1"/>
+          </a:fillRef>
+          <a:effectRef idx="0">
+            <a:schemeClr val="dk1"/>
+          </a:effectRef>
+          <a:fontRef idx="minor">
+            <a:schemeClr val="tx1"/>
+          </a:fontRef>
+        </p:style>
+      </p:cxnSp>
+      <p:sp>
+        <p:nvSpPr>
+          <p:cNvPr id="120" name="Up Arrow 119"/>
+          <p:cNvSpPr/>
+          <p:nvPr/>
+        </p:nvSpPr>
+        <p:spPr>
+          <a:xfrm rot="10800000">
+            <a:off x="7645400" y="4105275"/>
+            <a:ext cx="469900" cy="287336"/>
+          </a:xfrm>
+          <a:prstGeom prst="upArrow">
+            <a:avLst/>
+          </a:prstGeom>
+        </p:spPr>
+        <p:style>
+          <a:lnRef idx="2">
+            <a:schemeClr val="dk1">
+              <a:shade val="50000"/>
+            </a:schemeClr>
+          </a:lnRef>
+          <a:fillRef idx="1">
+            <a:schemeClr val="dk1"/>
+          </a:fillRef>
+          <a:effectRef idx="0">
+            <a:schemeClr val="dk1"/>
+          </a:effectRef>
+          <a:fontRef idx="minor">
+            <a:schemeClr val="lt1"/>
+          </a:fontRef>
+        </p:style>
+        <p:txBody>
+          <a:bodyPr rtlCol="0" anchor="ctr"/>
+          <a:lstStyle/>
+          <a:p>
+            <a:pPr algn="ctr"/>
+            <a:endParaRPr lang="en-US"/>
+          </a:p>
+        </p:txBody>
+      </p:sp>
+      <p:sp>
+        <p:nvSpPr>
+          <p:cNvPr id="121" name="Up Arrow 120"/>
+          <p:cNvSpPr/>
+          <p:nvPr/>
+        </p:nvSpPr>
+        <p:spPr>
+          <a:xfrm rot="10800000">
+            <a:off x="4152106" y="4962528"/>
+            <a:ext cx="469900" cy="381000"/>
+          </a:xfrm>
+          <a:prstGeom prst="upArrow">
+            <a:avLst/>
+          </a:prstGeom>
+        </p:spPr>
+        <p:style>
+          <a:lnRef idx="2">
+            <a:schemeClr val="dk1">
+              <a:shade val="50000"/>
+            </a:schemeClr>
+          </a:lnRef>
+          <a:fillRef idx="1">
+            <a:schemeClr val="dk1"/>
+          </a:fillRef>
+          <a:effectRef idx="0">
+            <a:schemeClr val="dk1"/>
+          </a:effectRef>
+          <a:fontRef idx="minor">
+            <a:schemeClr val="lt1"/>
+          </a:fontRef>
+        </p:style>
+        <p:txBody>
+          <a:bodyPr rtlCol="0" anchor="ctr"/>
+          <a:lstStyle/>
+          <a:p>
+            <a:pPr algn="ctr"/>
+            <a:endParaRPr lang="en-US"/>
+          </a:p>
+        </p:txBody>
+      </p:sp>
+      <p:sp>
+        <p:nvSpPr>
+          <p:cNvPr id="122" name="Up Arrow 121"/>
+          <p:cNvSpPr/>
+          <p:nvPr/>
+        </p:nvSpPr>
+        <p:spPr>
+          <a:xfrm rot="10800000">
+            <a:off x="2617788" y="4095750"/>
+            <a:ext cx="469900" cy="314322"/>
+          </a:xfrm>
+          <a:prstGeom prst="upArrow">
+            <a:avLst/>
+          </a:prstGeom>
+        </p:spPr>
+        <p:style>
+          <a:lnRef idx="2">
+            <a:schemeClr val="dk1">
+              <a:shade val="50000"/>
+            </a:schemeClr>
+          </a:lnRef>
+          <a:fillRef idx="1">
+            <a:schemeClr val="dk1"/>
+          </a:fillRef>
+          <a:effectRef idx="0">
+            <a:schemeClr val="dk1"/>
+          </a:effectRef>
+          <a:fontRef idx="minor">
+            <a:schemeClr val="lt1"/>
+          </a:fontRef>
+        </p:style>
+        <p:txBody>
+          <a:bodyPr rtlCol="0" anchor="ctr"/>
+          <a:lstStyle/>
+          <a:p>
+            <a:pPr algn="ctr"/>
+            <a:endParaRPr lang="en-US"/>
+          </a:p>
+        </p:txBody>
+      </p:sp>
+      <p:cxnSp>
+        <p:nvCxnSpPr>
+          <p:cNvPr id="123" name="Elbow Connector 122"/>
+          <p:cNvCxnSpPr>
+            <a:stCxn id="107" idx="3"/>
+            <a:endCxn id="118" idx="0"/>
+          </p:cNvCxnSpPr>
+          <p:nvPr/>
+        </p:nvCxnSpPr>
+        <p:spPr>
+          <a:xfrm flipV="1">
+            <a:off x="5829300" y="2033588"/>
+            <a:ext cx="2351088" cy="458787"/>
+          </a:xfrm>
+          <a:prstGeom prst="bentConnector4">
+            <a:avLst>
+              <a:gd name="adj1" fmla="val 5942"/>
+              <a:gd name="adj2" fmla="val 149827"/>
+            </a:avLst>
+          </a:prstGeom>
+          <a:ln w="38100">
+            <a:tailEnd type="triangle"/>
+          </a:ln>
+        </p:spPr>
+        <p:style>
+          <a:lnRef idx="1">
+            <a:schemeClr val="dk1"/>
+          </a:lnRef>
+          <a:fillRef idx="0">
+            <a:schemeClr val="dk1"/>
+          </a:fillRef>
+          <a:effectRef idx="0">
+            <a:schemeClr val="dk1"/>
+          </a:effectRef>
+          <a:fontRef idx="minor">
+            <a:schemeClr val="tx1"/>
+          </a:fontRef>
+        </p:style>
+      </p:cxnSp>
+      <p:grpSp>
+        <p:nvGrpSpPr>
+          <p:cNvPr id="124" name="Group 123"/>
+          <p:cNvGrpSpPr/>
+          <p:nvPr/>
+        </p:nvGrpSpPr>
+        <p:grpSpPr>
+          <a:xfrm>
+            <a:off x="4943475" y="752476"/>
+            <a:ext cx="4063999" cy="609600"/>
+            <a:chOff x="3581400" y="1006475"/>
+            <a:chExt cx="4063999" cy="609600"/>
+          </a:xfrm>
+        </p:grpSpPr>
+        <p:sp>
+          <p:nvSpPr>
+            <p:cNvPr id="125" name="Rectangle 124"/>
+            <p:cNvSpPr/>
+            <p:nvPr/>
+          </p:nvSpPr>
+          <p:spPr>
+            <a:xfrm>
+              <a:off x="3581400" y="1006475"/>
+              <a:ext cx="4063999" cy="609600"/>
+            </a:xfrm>
+            <a:prstGeom prst="rect">
+              <a:avLst/>
+            </a:prstGeom>
+          </p:spPr>
+          <p:style>
+            <a:lnRef idx="2">
+              <a:schemeClr val="dk1"/>
+            </a:lnRef>
+            <a:fillRef idx="1">
+              <a:schemeClr val="lt1"/>
+            </a:fillRef>
+            <a:effectRef idx="0">
+              <a:schemeClr val="dk1"/>
+            </a:effectRef>
+            <a:fontRef idx="minor">
+              <a:schemeClr val="dk1"/>
+            </a:fontRef>
+          </p:style>
+          <p:txBody>
+            <a:bodyPr rtlCol="0" anchor="ctr"/>
+            <a:lstStyle/>
+            <a:p>
+              <a:pPr algn="ctr"/>
+              <a:endParaRPr lang="en-US"/>
+            </a:p>
+          </p:txBody>
+        </p:sp>
+        <p:sp>
+          <p:nvSpPr>
+            <p:cNvPr id="126" name="Flowchart: Process 125"/>
+            <p:cNvSpPr/>
+            <p:nvPr/>
+          </p:nvSpPr>
+          <p:spPr>
+            <a:xfrm>
+              <a:off x="3701260" y="1104106"/>
+              <a:ext cx="1181100" cy="404813"/>
+            </a:xfrm>
+            <a:prstGeom prst="flowChartProcess">
+              <a:avLst/>
+            </a:prstGeom>
+          </p:spPr>
+          <p:style>
+            <a:lnRef idx="2">
+              <a:schemeClr val="accent1">
+                <a:shade val="50000"/>
+              </a:schemeClr>
+            </a:lnRef>
+            <a:fillRef idx="1">
+              <a:schemeClr val="accent1"/>
+            </a:fillRef>
+            <a:effectRef idx="0">
+              <a:schemeClr val="accent1"/>
+            </a:effectRef>
+            <a:fontRef idx="minor">
+              <a:schemeClr val="lt1"/>
+            </a:fontRef>
+          </p:style>
+          <p:txBody>
+            <a:bodyPr rtlCol="0" anchor="ctr"/>
+            <a:lstStyle/>
+            <a:p>
+              <a:pPr algn="ctr"/>
+              <a:r>
+                <a:rPr lang="en-US" dirty="0" smtClean="0"/>
+                <a:t>Complete</a:t>
+              </a:r>
+              <a:endParaRPr lang="en-US" dirty="0"/>
+            </a:p>
+          </p:txBody>
+        </p:sp>
+        <p:sp>
+          <p:nvSpPr>
+            <p:cNvPr id="127" name="Flowchart: Process 126"/>
+            <p:cNvSpPr/>
+            <p:nvPr/>
+          </p:nvSpPr>
+          <p:spPr>
+            <a:xfrm>
+              <a:off x="4964908" y="1104106"/>
+              <a:ext cx="1051720" cy="404813"/>
+            </a:xfrm>
+            <a:prstGeom prst="flowChartProcess">
+              <a:avLst/>
+            </a:prstGeom>
+          </p:spPr>
+          <p:style>
+            <a:lnRef idx="2">
+              <a:schemeClr val="accent3">
+                <a:shade val="50000"/>
+              </a:schemeClr>
+            </a:lnRef>
+            <a:fillRef idx="1">
+              <a:schemeClr val="accent3"/>
+            </a:fillRef>
+            <a:effectRef idx="0">
+              <a:schemeClr val="accent3"/>
+            </a:effectRef>
+            <a:fontRef idx="minor">
+              <a:schemeClr val="lt1"/>
+            </a:fontRef>
+          </p:style>
+          <p:txBody>
+            <a:bodyPr rtlCol="0" anchor="ctr"/>
+            <a:lstStyle/>
+            <a:p>
+              <a:pPr algn="ctr"/>
+              <a:r>
+                <a:rPr lang="en-US" dirty="0" smtClean="0"/>
+                <a:t>In Work</a:t>
+              </a:r>
+              <a:endParaRPr lang="en-US" dirty="0"/>
+            </a:p>
+          </p:txBody>
+        </p:sp>
+        <p:sp>
+          <p:nvSpPr>
+            <p:cNvPr id="128" name="Flowchart: Process 127"/>
+            <p:cNvSpPr/>
+            <p:nvPr/>
+          </p:nvSpPr>
+          <p:spPr>
+            <a:xfrm>
+              <a:off x="6099176" y="1104106"/>
+              <a:ext cx="1458122" cy="404813"/>
+            </a:xfrm>
+            <a:prstGeom prst="flowChartProcess">
+              <a:avLst/>
+            </a:prstGeom>
+          </p:spPr>
+          <p:style>
+            <a:lnRef idx="2">
+              <a:schemeClr val="accent2">
+                <a:shade val="50000"/>
+              </a:schemeClr>
+            </a:lnRef>
+            <a:fillRef idx="1">
+              <a:schemeClr val="accent2"/>
+            </a:fillRef>
+            <a:effectRef idx="0">
+              <a:schemeClr val="accent2"/>
+            </a:effectRef>
+            <a:fontRef idx="minor">
+              <a:schemeClr val="lt1"/>
+            </a:fontRef>
+          </p:style>
+          <p:txBody>
+            <a:bodyPr rtlCol="0" anchor="ctr"/>
+            <a:lstStyle/>
+            <a:p>
+              <a:pPr algn="ctr"/>
+              <a:r>
+                <a:rPr lang="en-US" dirty="0" smtClean="0"/>
+                <a:t>Not Started</a:t>
+              </a:r>
+              <a:endParaRPr lang="en-US" dirty="0"/>
+            </a:p>
+          </p:txBody>
+        </p:sp>
+      </p:grpSp>
+      <p:sp>
+        <p:nvSpPr>
+          <p:cNvPr id="129" name="TextBox 128"/>
+          <p:cNvSpPr txBox="1"/>
+          <p:nvPr/>
+        </p:nvSpPr>
+        <p:spPr>
+          <a:xfrm>
+            <a:off x="224627" y="1476932"/>
+            <a:ext cx="1990725" cy="369332"/>
+          </a:xfrm>
+          <a:prstGeom prst="rect">
+            <a:avLst/>
+          </a:prstGeom>
+          <a:noFill/>
+        </p:spPr>
+        <p:txBody>
+          <a:bodyPr wrap="square" rtlCol="0">
+            <a:spAutoFit/>
+          </a:bodyPr>
+          <a:lstStyle/>
+          <a:p>
+            <a:r>
+              <a:rPr lang="en-US" dirty="0" smtClean="0"/>
+              <a:t>EHR Framework</a:t>
+            </a:r>
+            <a:endParaRPr lang="en-US" dirty="0"/>
+          </a:p>
+        </p:txBody>
+      </p:sp>
+      <p:sp>
+        <p:nvSpPr>
+          <p:cNvPr id="130" name="Can 129"/>
+          <p:cNvSpPr/>
+          <p:nvPr/>
+        </p:nvSpPr>
+        <p:spPr>
+          <a:xfrm>
+            <a:off x="5208638" y="5161672"/>
+            <a:ext cx="1790700" cy="1435100"/>
+          </a:xfrm>
+          <a:prstGeom prst="can">
+            <a:avLst/>
+          </a:prstGeom>
+        </p:spPr>
+        <p:style>
+          <a:lnRef idx="2">
+            <a:schemeClr val="accent1">
+              <a:shade val="50000"/>
+            </a:schemeClr>
+          </a:lnRef>
+          <a:fillRef idx="1">
+            <a:schemeClr val="accent1"/>
+          </a:fillRef>
+          <a:effectRef idx="0">
+            <a:schemeClr val="accent1"/>
+          </a:effectRef>
+          <a:fontRef idx="minor">
+            <a:schemeClr val="lt1"/>
+          </a:fontRef>
+        </p:style>
+        <p:txBody>
+          <a:bodyPr rtlCol="0" anchor="ctr"/>
+          <a:lstStyle/>
+          <a:p>
+            <a:pPr algn="ctr"/>
+            <a:r>
+              <a:rPr lang="en-US" dirty="0" err="1" smtClean="0"/>
+              <a:t>Fitbit</a:t>
+            </a:r>
+            <a:r>
+              <a:rPr lang="en-US" dirty="0" smtClean="0"/>
+              <a:t> Data Repository</a:t>
+            </a:r>
+            <a:endParaRPr lang="en-US" dirty="0"/>
+          </a:p>
+        </p:txBody>
+      </p:sp>
+      <p:sp>
+        <p:nvSpPr>
+          <p:cNvPr id="131" name="Up Arrow 130"/>
+          <p:cNvSpPr/>
+          <p:nvPr/>
+        </p:nvSpPr>
+        <p:spPr>
+          <a:xfrm>
+            <a:off x="7412038" y="4979989"/>
+            <a:ext cx="469900" cy="381000"/>
+          </a:xfrm>
+          <a:prstGeom prst="upArrow">
+            <a:avLst/>
+          </a:prstGeom>
+        </p:spPr>
+        <p:style>
+          <a:lnRef idx="2">
+            <a:schemeClr val="dk1">
+              <a:shade val="50000"/>
+            </a:schemeClr>
+          </a:lnRef>
+          <a:fillRef idx="1">
+            <a:schemeClr val="dk1"/>
+          </a:fillRef>
+          <a:effectRef idx="0">
+            <a:schemeClr val="dk1"/>
+          </a:effectRef>
+          <a:fontRef idx="minor">
+            <a:schemeClr val="lt1"/>
+          </a:fontRef>
+        </p:style>
+        <p:txBody>
+          <a:bodyPr rtlCol="0" anchor="ctr"/>
+          <a:lstStyle/>
+          <a:p>
+            <a:pPr algn="ctr"/>
+            <a:endParaRPr lang="en-US"/>
+          </a:p>
+        </p:txBody>
+      </p:sp>
+      <p:sp>
+        <p:nvSpPr>
+          <p:cNvPr id="132" name="Up Arrow 131"/>
+          <p:cNvSpPr/>
+          <p:nvPr/>
+        </p:nvSpPr>
+        <p:spPr>
+          <a:xfrm rot="10800000">
+            <a:off x="7955362" y="4980900"/>
+            <a:ext cx="469900" cy="381000"/>
+          </a:xfrm>
+          <a:prstGeom prst="upArrow">
+            <a:avLst/>
+          </a:prstGeom>
+        </p:spPr>
+        <p:style>
+          <a:lnRef idx="2">
+            <a:schemeClr val="dk1">
+              <a:shade val="50000"/>
+            </a:schemeClr>
+          </a:lnRef>
+          <a:fillRef idx="1">
+            <a:schemeClr val="dk1"/>
+          </a:fillRef>
+          <a:effectRef idx="0">
+            <a:schemeClr val="dk1"/>
+          </a:effectRef>
+          <a:fontRef idx="minor">
+            <a:schemeClr val="lt1"/>
+          </a:fontRef>
+        </p:style>
+        <p:txBody>
+          <a:bodyPr rtlCol="0" anchor="ctr"/>
+          <a:lstStyle/>
+          <a:p>
+            <a:pPr algn="ctr"/>
+            <a:endParaRPr lang="en-US"/>
+          </a:p>
+        </p:txBody>
+      </p:sp>
+      <p:sp>
+        <p:nvSpPr>
+          <p:cNvPr id="133" name="Up Arrow 132"/>
+          <p:cNvSpPr/>
+          <p:nvPr/>
+        </p:nvSpPr>
+        <p:spPr>
+          <a:xfrm>
+            <a:off x="5876728" y="4962528"/>
+            <a:ext cx="469900" cy="381000"/>
+          </a:xfrm>
+          <a:prstGeom prst="upArrow">
+            <a:avLst/>
+          </a:prstGeom>
+        </p:spPr>
+        <p:style>
+          <a:lnRef idx="2">
+            <a:schemeClr val="dk1">
+              <a:shade val="50000"/>
+            </a:schemeClr>
+          </a:lnRef>
+          <a:fillRef idx="1">
+            <a:schemeClr val="dk1"/>
+          </a:fillRef>
+          <a:effectRef idx="0">
+            <a:schemeClr val="dk1"/>
+          </a:effectRef>
+          <a:fontRef idx="minor">
+            <a:schemeClr val="lt1"/>
+          </a:fontRef>
+        </p:style>
+        <p:txBody>
+          <a:bodyPr rtlCol="0" anchor="ctr"/>
+          <a:lstStyle/>
+          <a:p>
+            <a:pPr algn="ctr"/>
+            <a:endParaRPr lang="en-US"/>
+          </a:p>
+        </p:txBody>
+      </p:sp>
+      <p:sp>
+        <p:nvSpPr>
+          <p:cNvPr id="134" name="Up Arrow 133"/>
+          <p:cNvSpPr/>
+          <p:nvPr/>
+        </p:nvSpPr>
+        <p:spPr>
+          <a:xfrm rot="10800000">
+            <a:off x="1564678" y="4960093"/>
+            <a:ext cx="469900" cy="381000"/>
+          </a:xfrm>
+          <a:prstGeom prst="upArrow">
+            <a:avLst/>
+          </a:prstGeom>
+        </p:spPr>
+        <p:style>
+          <a:lnRef idx="2">
+            <a:schemeClr val="dk1">
+              <a:shade val="50000"/>
+            </a:schemeClr>
+          </a:lnRef>
+          <a:fillRef idx="1">
+            <a:schemeClr val="dk1"/>
+          </a:fillRef>
+          <a:effectRef idx="0">
+            <a:schemeClr val="dk1"/>
+          </a:effectRef>
+          <a:fontRef idx="minor">
+            <a:schemeClr val="lt1"/>
+          </a:fontRef>
+        </p:style>
+        <p:txBody>
+          <a:bodyPr rtlCol="0" anchor="ctr"/>
+          <a:lstStyle/>
+          <a:p>
+            <a:pPr algn="ctr"/>
+            <a:endParaRPr lang="en-US"/>
+          </a:p>
+        </p:txBody>
+      </p:sp>
+      <p:pic>
+        <p:nvPicPr>
+          <p:cNvPr id="135" name="Sound 12">
+            <a:hlinkClick r:id="" action="ppaction://media"/>
+          </p:cNvPr>
+          <p:cNvPicPr>
+            <a:picLocks noChangeAspect="1"/>
+          </p:cNvPicPr>
+          <p:nvPr>
+            <a:audioFile r:link="rId2"/>
+            <p:extLst>
+              <p:ext uri="{DAA4B4D4-6D71-4841-9C94-3DE7FCFB9230}">
+                <p14:media xmlns:p14="http://schemas.microsoft.com/office/powerpoint/2010/main" r:embed="rId1"/>
+              </p:ext>
+            </p:extLst>
+          </p:nvPr>
+        </p:nvPicPr>
+        <p:blipFill>
+          <a:blip r:embed="rId4"/>
+          <a:stretch>
+            <a:fillRect/>
+          </a:stretch>
+        </p:blipFill>
+        <p:spPr>
+          <a:xfrm>
+            <a:off x="8178800" y="5892800"/>
+            <a:ext cx="812800" cy="812800"/>
+          </a:xfrm>
+          <a:prstGeom prst="rect">
+            <a:avLst/>
+          </a:prstGeom>
+        </p:spPr>
+      </p:pic>
+    </p:spTree>
+    <p:extLst>
+      <p:ext uri="{BB962C8B-B14F-4D97-AF65-F5344CB8AC3E}">
+        <p14:creationId xmlns:p14="http://schemas.microsoft.com/office/powerpoint/2010/main" val="2382804826"/>
+      </p:ext>
+    </p:extLst>
+  </p:cSld>
+  <p:clrMapOvr>
+    <a:masterClrMapping/>
+  </p:clrMapOvr>
+  <p:transition spd="slow">
+    <p:fade/>
+  </p:transition>
+  <p:timing>
+    <p:tnLst>
+      <p:par>
+        <p:cTn id="1" dur="indefinite" restart="never" nodeType="tmRoot">
+          <p:childTnLst>
+            <p:seq concurrent="1" nextAc="seek">
+              <p:cTn id="2" dur="indefinite" nodeType="mainSeq">
+                <p:childTnLst>
+                  <p:par>
+                    <p:cTn id="3" fill="hold">
+                      <p:stCondLst>
+                        <p:cond delay="indefinite"/>
+                        <p:cond evt="onBegin" delay="0">
+                          <p:tn val="2"/>
+                        </p:cond>
+                      </p:stCondLst>
+                      <p:childTnLst>
+                        <p:par>
+                          <p:cTn id="4" fill="hold">
+                            <p:stCondLst>
+                              <p:cond delay="0"/>
+                            </p:stCondLst>
+                            <p:childTnLst>
+                              <p:par>
+                                <p:cTn id="5" presetID="1" presetClass="mediacall" presetSubtype="0" fill="hold" nodeType="afterEffect">
+                                  <p:stCondLst>
+                                    <p:cond delay="0"/>
+                                  </p:stCondLst>
+                                  <p:childTnLst>
+                                    <p:cmd type="call" cmd="playFrom(0.0)">
+                                      <p:cBhvr>
+                                        <p:cTn id="6" dur="1" fill="hold"/>
+                                        <p:tgtEl>
+                                          <p:spTgt spid="135"/>
+                                        </p:tgtEl>
+                                      </p:cBhvr>
+                                    </p:cmd>
+                                  </p:childTnLst>
+                                </p:cTn>
+                              </p:par>
+                            </p:childTnLst>
+                          </p:cTn>
+                        </p:par>
+                      </p:childTnLst>
+                    </p:cTn>
+                  </p:par>
+                </p:childTnLst>
+              </p:cTn>
+              <p:prevCondLst>
+                <p:cond evt="onPrev" delay="0">
+                  <p:tgtEl>
+                    <p:sldTgt/>
+                  </p:tgtEl>
+                </p:cond>
+              </p:prevCondLst>
+              <p:nextCondLst>
+                <p:cond evt="onNext" delay="0">
+                  <p:tgtEl>
+                    <p:sldTgt/>
+                  </p:tgtEl>
+                </p:cond>
+              </p:nextCondLst>
+            </p:seq>
+            <p:audio isNarration="1">
+              <p:cMediaNode vol="80000" showWhenStopped="0">
+                <p:cTn id="7" fill="hold" display="0">
+                  <p:stCondLst>
+                    <p:cond delay="indefinite"/>
+                  </p:stCondLst>
+                  <p:endCondLst>
+                    <p:cond evt="onStopAudio" delay="0">
+                      <p:tgtEl>
+                        <p:sldTgt/>
+                      </p:tgtEl>
+                    </p:cond>
+                  </p:endCondLst>
+                </p:cTn>
+                <p:tgtEl>
+                  <p:spTgt spid="135"/>
+                </p:tgtEl>
+              </p:cMediaNode>
+            </p:audio>
+          </p:childTnLst>
+        </p:cTn>
+      </p:par>
+    </p:tnLst>
+  </p:timing>
+</p:sld>
+</file>
+
+<file path=ppt/slides/slide8.xml><?xml version="1.0" encoding="utf-8"?>
 <p:sld xmlns:a="http://schemas.openxmlformats.org/drawingml/2006/main" xmlns:r="http://schemas.openxmlformats.org/officeDocument/2006/relationships" xmlns:p="http://schemas.openxmlformats.org/presentationml/2006/main">
   <p:cSld>
     <p:spTree>

</xml_diff>